<commit_message>
[jamesemann]chore: fixes post video
</commit_message>
<xml_diff>
--- a/slides-03.pptx
+++ b/slides-03.pptx
@@ -3753,33 +3753,15 @@
                                   </p:childTnLst>
                                 </p:cTn>
                               </p:par>
-                            </p:childTnLst>
-                          </p:cTn>
-                        </p:par>
-                      </p:childTnLst>
-                    </p:cTn>
-                  </p:par>
-                  <p:par>
-                    <p:cTn id="8" fill="hold">
-                      <p:stCondLst>
-                        <p:cond delay="indefinite"/>
-                      </p:stCondLst>
-                      <p:childTnLst>
-                        <p:par>
-                          <p:cTn id="9" fill="hold">
-                            <p:stCondLst>
-                              <p:cond delay="0"/>
-                            </p:stCondLst>
-                            <p:childTnLst>
                               <p:par>
-                                <p:cTn id="10" presetID="10" presetClass="entr" presetSubtype="0" fill="hold" nodeType="clickEffect">
+                                <p:cTn id="8" presetID="10" presetClass="entr" presetSubtype="0" fill="hold" nodeType="withEffect">
                                   <p:stCondLst>
                                     <p:cond delay="0"/>
                                   </p:stCondLst>
                                   <p:childTnLst>
                                     <p:set>
                                       <p:cBhvr>
-                                        <p:cTn id="11" dur="1" fill="hold">
+                                        <p:cTn id="9" dur="1" fill="hold">
                                           <p:stCondLst>
                                             <p:cond delay="0"/>
                                           </p:stCondLst>
@@ -3801,7 +3783,7 @@
                                     </p:set>
                                     <p:animEffect transition="in" filter="fade">
                                       <p:cBhvr>
-                                        <p:cTn id="12" dur="500"/>
+                                        <p:cTn id="10" dur="500"/>
                                         <p:tgtEl>
                                           <p:spTgt spid="5">
                                             <p:txEl>
@@ -3815,14 +3797,14 @@
                                 </p:cTn>
                               </p:par>
                               <p:par>
-                                <p:cTn id="13" presetID="10" presetClass="entr" presetSubtype="0" fill="hold" nodeType="withEffect">
+                                <p:cTn id="11" presetID="10" presetClass="entr" presetSubtype="0" fill="hold" nodeType="withEffect">
                                   <p:stCondLst>
                                     <p:cond delay="0"/>
                                   </p:stCondLst>
                                   <p:childTnLst>
                                     <p:set>
                                       <p:cBhvr>
-                                        <p:cTn id="14" dur="1" fill="hold">
+                                        <p:cTn id="12" dur="1" fill="hold">
                                           <p:stCondLst>
                                             <p:cond delay="0"/>
                                           </p:stCondLst>
@@ -3844,7 +3826,7 @@
                                     </p:set>
                                     <p:animEffect transition="in" filter="fade">
                                       <p:cBhvr>
-                                        <p:cTn id="15" dur="500"/>
+                                        <p:cTn id="13" dur="500"/>
                                         <p:tgtEl>
                                           <p:spTgt spid="5">
                                             <p:txEl>
@@ -3864,26 +3846,26 @@
                     </p:cTn>
                   </p:par>
                   <p:par>
-                    <p:cTn id="16" fill="hold">
+                    <p:cTn id="14" fill="hold">
                       <p:stCondLst>
                         <p:cond delay="indefinite"/>
                       </p:stCondLst>
                       <p:childTnLst>
                         <p:par>
-                          <p:cTn id="17" fill="hold">
+                          <p:cTn id="15" fill="hold">
                             <p:stCondLst>
                               <p:cond delay="0"/>
                             </p:stCondLst>
                             <p:childTnLst>
                               <p:par>
-                                <p:cTn id="18" presetID="10" presetClass="entr" presetSubtype="0" fill="hold" nodeType="clickEffect">
+                                <p:cTn id="16" presetID="10" presetClass="entr" presetSubtype="0" fill="hold" nodeType="clickEffect">
                                   <p:stCondLst>
                                     <p:cond delay="0"/>
                                   </p:stCondLst>
                                   <p:childTnLst>
                                     <p:set>
                                       <p:cBhvr>
-                                        <p:cTn id="19" dur="1" fill="hold">
+                                        <p:cTn id="17" dur="1" fill="hold">
                                           <p:stCondLst>
                                             <p:cond delay="0"/>
                                           </p:stCondLst>
@@ -3905,7 +3887,7 @@
                                     </p:set>
                                     <p:animEffect transition="in" filter="fade">
                                       <p:cBhvr>
-                                        <p:cTn id="20" dur="500"/>
+                                        <p:cTn id="18" dur="500"/>
                                         <p:tgtEl>
                                           <p:spTgt spid="5">
                                             <p:txEl>
@@ -3918,33 +3900,15 @@
                                   </p:childTnLst>
                                 </p:cTn>
                               </p:par>
-                            </p:childTnLst>
-                          </p:cTn>
-                        </p:par>
-                      </p:childTnLst>
-                    </p:cTn>
-                  </p:par>
-                  <p:par>
-                    <p:cTn id="21" fill="hold">
-                      <p:stCondLst>
-                        <p:cond delay="indefinite"/>
-                      </p:stCondLst>
-                      <p:childTnLst>
-                        <p:par>
-                          <p:cTn id="22" fill="hold">
-                            <p:stCondLst>
-                              <p:cond delay="0"/>
-                            </p:stCondLst>
-                            <p:childTnLst>
                               <p:par>
-                                <p:cTn id="23" presetID="10" presetClass="entr" presetSubtype="0" fill="hold" nodeType="clickEffect">
+                                <p:cTn id="19" presetID="10" presetClass="entr" presetSubtype="0" fill="hold" nodeType="withEffect">
                                   <p:stCondLst>
                                     <p:cond delay="0"/>
                                   </p:stCondLst>
                                   <p:childTnLst>
                                     <p:set>
                                       <p:cBhvr>
-                                        <p:cTn id="24" dur="1" fill="hold">
+                                        <p:cTn id="20" dur="1" fill="hold">
                                           <p:stCondLst>
                                             <p:cond delay="0"/>
                                           </p:stCondLst>
@@ -3966,7 +3930,7 @@
                                     </p:set>
                                     <p:animEffect transition="in" filter="fade">
                                       <p:cBhvr>
-                                        <p:cTn id="25" dur="500"/>
+                                        <p:cTn id="21" dur="500"/>
                                         <p:tgtEl>
                                           <p:spTgt spid="5">
                                             <p:txEl>
@@ -3980,14 +3944,14 @@
                                 </p:cTn>
                               </p:par>
                               <p:par>
-                                <p:cTn id="26" presetID="10" presetClass="entr" presetSubtype="0" fill="hold" nodeType="withEffect">
+                                <p:cTn id="22" presetID="10" presetClass="entr" presetSubtype="0" fill="hold" nodeType="withEffect">
                                   <p:stCondLst>
                                     <p:cond delay="0"/>
                                   </p:stCondLst>
                                   <p:childTnLst>
                                     <p:set>
                                       <p:cBhvr>
-                                        <p:cTn id="27" dur="1" fill="hold">
+                                        <p:cTn id="23" dur="1" fill="hold">
                                           <p:stCondLst>
                                             <p:cond delay="0"/>
                                           </p:stCondLst>
@@ -4009,7 +3973,7 @@
                                     </p:set>
                                     <p:animEffect transition="in" filter="fade">
                                       <p:cBhvr>
-                                        <p:cTn id="28" dur="500"/>
+                                        <p:cTn id="24" dur="500"/>
                                         <p:tgtEl>
                                           <p:spTgt spid="5">
                                             <p:txEl>
@@ -4022,15 +3986,33 @@
                                   </p:childTnLst>
                                 </p:cTn>
                               </p:par>
+                            </p:childTnLst>
+                          </p:cTn>
+                        </p:par>
+                      </p:childTnLst>
+                    </p:cTn>
+                  </p:par>
+                  <p:par>
+                    <p:cTn id="25" fill="hold">
+                      <p:stCondLst>
+                        <p:cond delay="indefinite"/>
+                      </p:stCondLst>
+                      <p:childTnLst>
+                        <p:par>
+                          <p:cTn id="26" fill="hold">
+                            <p:stCondLst>
+                              <p:cond delay="0"/>
+                            </p:stCondLst>
+                            <p:childTnLst>
                               <p:par>
-                                <p:cTn id="29" presetID="10" presetClass="entr" presetSubtype="0" fill="hold" nodeType="withEffect">
+                                <p:cTn id="27" presetID="10" presetClass="entr" presetSubtype="0" fill="hold" nodeType="clickEffect">
                                   <p:stCondLst>
                                     <p:cond delay="0"/>
                                   </p:stCondLst>
                                   <p:childTnLst>
                                     <p:set>
                                       <p:cBhvr>
-                                        <p:cTn id="30" dur="1" fill="hold">
+                                        <p:cTn id="28" dur="1" fill="hold">
                                           <p:stCondLst>
                                             <p:cond delay="0"/>
                                           </p:stCondLst>
@@ -4052,7 +4034,7 @@
                                     </p:set>
                                     <p:animEffect transition="in" filter="fade">
                                       <p:cBhvr>
-                                        <p:cTn id="31" dur="500"/>
+                                        <p:cTn id="29" dur="500"/>
                                         <p:tgtEl>
                                           <p:spTgt spid="5">
                                             <p:txEl>
@@ -4066,14 +4048,14 @@
                                 </p:cTn>
                               </p:par>
                               <p:par>
-                                <p:cTn id="32" presetID="10" presetClass="entr" presetSubtype="0" fill="hold" nodeType="withEffect">
+                                <p:cTn id="30" presetID="10" presetClass="entr" presetSubtype="0" fill="hold" nodeType="withEffect">
                                   <p:stCondLst>
                                     <p:cond delay="0"/>
                                   </p:stCondLst>
                                   <p:childTnLst>
                                     <p:set>
                                       <p:cBhvr>
-                                        <p:cTn id="33" dur="1" fill="hold">
+                                        <p:cTn id="31" dur="1" fill="hold">
                                           <p:stCondLst>
                                             <p:cond delay="0"/>
                                           </p:stCondLst>
@@ -4095,7 +4077,7 @@
                                     </p:set>
                                     <p:animEffect transition="in" filter="fade">
                                       <p:cBhvr>
-                                        <p:cTn id="34" dur="500"/>
+                                        <p:cTn id="32" dur="500"/>
                                         <p:tgtEl>
                                           <p:spTgt spid="5">
                                             <p:txEl>
@@ -4109,14 +4091,14 @@
                                 </p:cTn>
                               </p:par>
                               <p:par>
-                                <p:cTn id="35" presetID="10" presetClass="entr" presetSubtype="0" fill="hold" nodeType="withEffect">
+                                <p:cTn id="33" presetID="10" presetClass="entr" presetSubtype="0" fill="hold" nodeType="withEffect">
                                   <p:stCondLst>
                                     <p:cond delay="0"/>
                                   </p:stCondLst>
                                   <p:childTnLst>
                                     <p:set>
                                       <p:cBhvr>
-                                        <p:cTn id="36" dur="1" fill="hold">
+                                        <p:cTn id="34" dur="1" fill="hold">
                                           <p:stCondLst>
                                             <p:cond delay="0"/>
                                           </p:stCondLst>
@@ -4138,7 +4120,7 @@
                                     </p:set>
                                     <p:animEffect transition="in" filter="fade">
                                       <p:cBhvr>
-                                        <p:cTn id="37" dur="500"/>
+                                        <p:cTn id="35" dur="500"/>
                                         <p:tgtEl>
                                           <p:spTgt spid="5">
                                             <p:txEl>
@@ -4151,8 +4133,26 @@
                                   </p:childTnLst>
                                 </p:cTn>
                               </p:par>
+                            </p:childTnLst>
+                          </p:cTn>
+                        </p:par>
+                      </p:childTnLst>
+                    </p:cTn>
+                  </p:par>
+                  <p:par>
+                    <p:cTn id="36" fill="hold">
+                      <p:stCondLst>
+                        <p:cond delay="indefinite"/>
+                      </p:stCondLst>
+                      <p:childTnLst>
+                        <p:par>
+                          <p:cTn id="37" fill="hold">
+                            <p:stCondLst>
+                              <p:cond delay="0"/>
+                            </p:stCondLst>
+                            <p:childTnLst>
                               <p:par>
-                                <p:cTn id="38" presetID="10" presetClass="entr" presetSubtype="0" fill="hold" nodeType="withEffect">
+                                <p:cTn id="38" presetID="10" presetClass="entr" presetSubtype="0" fill="hold" nodeType="clickEffect">
                                   <p:stCondLst>
                                     <p:cond delay="0"/>
                                   </p:stCondLst>
@@ -4607,6 +4607,21 @@
 </file>
 
 <file path=customXml/item1.xml><?xml version="1.0" encoding="utf-8"?>
+<p:properties xmlns:p="http://schemas.microsoft.com/office/2006/metadata/properties" xmlns:xsi="http://www.w3.org/2001/XMLSchema-instance" xmlns:pc="http://schemas.microsoft.com/office/infopath/2007/PartnerControls">
+  <documentManagement/>
+</p:properties>
+</file>
+
+<file path=customXml/item2.xml><?xml version="1.0" encoding="utf-8"?>
+<?mso-contentType ?>
+<FormTemplates xmlns="http://schemas.microsoft.com/sharepoint/v3/contenttype/forms">
+  <Display>DocumentLibraryForm</Display>
+  <Edit>DocumentLibraryForm</Edit>
+  <New>DocumentLibraryForm</New>
+</FormTemplates>
+</file>
+
+<file path=customXml/item3.xml><?xml version="1.0" encoding="utf-8"?>
 <ct:contentTypeSchema xmlns:ct="http://schemas.microsoft.com/office/2006/metadata/contentType" xmlns:ma="http://schemas.microsoft.com/office/2006/metadata/properties/metaAttributes" ct:_="" ma:_="" ma:contentTypeName="Document" ma:contentTypeID="0x010100703B484F5157F144A63D990976966D7F" ma:contentTypeVersion="9" ma:contentTypeDescription="Create a new document." ma:contentTypeScope="" ma:versionID="c74c39a9b210d56c97a2657c6b5f9890">
   <xsd:schema xmlns:xsd="http://www.w3.org/2001/XMLSchema" xmlns:xs="http://www.w3.org/2001/XMLSchema" xmlns:p="http://schemas.microsoft.com/office/2006/metadata/properties" xmlns:ns3="114f7c07-9686-4f15-84c7-77db63eae11d" xmlns:ns4="239450d9-9000-4387-af9f-163882741cd6" targetNamespace="http://schemas.microsoft.com/office/2006/metadata/properties" ma:root="true" ma:fieldsID="752cc0a63f6ea62be715b90ca95edc88" ns3:_="" ns4:_="">
     <xsd:import namespace="114f7c07-9686-4f15-84c7-77db63eae11d"/>
@@ -4803,22 +4818,32 @@
 </ct:contentTypeSchema>
 </file>
 
-<file path=customXml/item2.xml><?xml version="1.0" encoding="utf-8"?>
-<?mso-contentType ?>
-<FormTemplates xmlns="http://schemas.microsoft.com/sharepoint/v3/contenttype/forms">
-  <Display>DocumentLibraryForm</Display>
-  <Edit>DocumentLibraryForm</Edit>
-  <New>DocumentLibraryForm</New>
-</FormTemplates>
+<file path=customXml/itemProps1.xml><?xml version="1.0" encoding="utf-8"?>
+<ds:datastoreItem xmlns:ds="http://schemas.openxmlformats.org/officeDocument/2006/customXml" ds:itemID="{BC31ADFE-D865-42E9-91DE-906F919BFEE8}">
+  <ds:schemaRefs>
+    <ds:schemaRef ds:uri="114f7c07-9686-4f15-84c7-77db63eae11d"/>
+    <ds:schemaRef ds:uri="http://schemas.microsoft.com/office/2006/documentManagement/types"/>
+    <ds:schemaRef ds:uri="http://purl.org/dc/elements/1.1/"/>
+    <ds:schemaRef ds:uri="http://purl.org/dc/terms/"/>
+    <ds:schemaRef ds:uri="http://schemas.microsoft.com/office/2006/metadata/properties"/>
+    <ds:schemaRef ds:uri="http://schemas.openxmlformats.org/package/2006/metadata/core-properties"/>
+    <ds:schemaRef ds:uri="239450d9-9000-4387-af9f-163882741cd6"/>
+    <ds:schemaRef ds:uri="http://www.w3.org/XML/1998/namespace"/>
+    <ds:schemaRef ds:uri="http://schemas.microsoft.com/office/infopath/2007/PartnerControls"/>
+    <ds:schemaRef ds:uri="http://purl.org/dc/dcmitype/"/>
+  </ds:schemaRefs>
+</ds:datastoreItem>
 </file>
 
-<file path=customXml/item3.xml><?xml version="1.0" encoding="utf-8"?>
-<p:properties xmlns:p="http://schemas.microsoft.com/office/2006/metadata/properties" xmlns:xsi="http://www.w3.org/2001/XMLSchema-instance" xmlns:pc="http://schemas.microsoft.com/office/infopath/2007/PartnerControls">
-  <documentManagement/>
-</p:properties>
+<file path=customXml/itemProps2.xml><?xml version="1.0" encoding="utf-8"?>
+<ds:datastoreItem xmlns:ds="http://schemas.openxmlformats.org/officeDocument/2006/customXml" ds:itemID="{214E03FF-B56D-46DB-9240-3867F9D89F73}">
+  <ds:schemaRefs>
+    <ds:schemaRef ds:uri="http://schemas.microsoft.com/sharepoint/v3/contenttype/forms"/>
+  </ds:schemaRefs>
+</ds:datastoreItem>
 </file>
 
-<file path=customXml/itemProps1.xml><?xml version="1.0" encoding="utf-8"?>
+<file path=customXml/itemProps3.xml><?xml version="1.0" encoding="utf-8"?>
 <ds:datastoreItem xmlns:ds="http://schemas.openxmlformats.org/officeDocument/2006/customXml" ds:itemID="{6E126AD0-DA0F-4BCE-879C-CE147FE3D41D}">
   <ds:schemaRefs>
     <ds:schemaRef ds:uri="http://schemas.microsoft.com/office/2006/metadata/contentType"/>
@@ -4835,29 +4860,4 @@
     <ds:schemaRef ds:uri="http://schemas.microsoft.com/internal/obd"/>
   </ds:schemaRefs>
 </ds:datastoreItem>
-</file>
-
-<file path=customXml/itemProps2.xml><?xml version="1.0" encoding="utf-8"?>
-<ds:datastoreItem xmlns:ds="http://schemas.openxmlformats.org/officeDocument/2006/customXml" ds:itemID="{214E03FF-B56D-46DB-9240-3867F9D89F73}">
-  <ds:schemaRefs>
-    <ds:schemaRef ds:uri="http://schemas.microsoft.com/sharepoint/v3/contenttype/forms"/>
-  </ds:schemaRefs>
-</ds:datastoreItem>
-</file>
-
-<file path=customXml/itemProps3.xml><?xml version="1.0" encoding="utf-8"?>
-<ds:datastoreItem xmlns:ds="http://schemas.openxmlformats.org/officeDocument/2006/customXml" ds:itemID="{BC31ADFE-D865-42E9-91DE-906F919BFEE8}">
-  <ds:schemaRefs>
-    <ds:schemaRef ds:uri="114f7c07-9686-4f15-84c7-77db63eae11d"/>
-    <ds:schemaRef ds:uri="http://schemas.microsoft.com/office/2006/documentManagement/types"/>
-    <ds:schemaRef ds:uri="http://purl.org/dc/elements/1.1/"/>
-    <ds:schemaRef ds:uri="http://purl.org/dc/terms/"/>
-    <ds:schemaRef ds:uri="http://schemas.microsoft.com/office/2006/metadata/properties"/>
-    <ds:schemaRef ds:uri="http://schemas.openxmlformats.org/package/2006/metadata/core-properties"/>
-    <ds:schemaRef ds:uri="239450d9-9000-4387-af9f-163882741cd6"/>
-    <ds:schemaRef ds:uri="http://www.w3.org/XML/1998/namespace"/>
-    <ds:schemaRef ds:uri="http://schemas.microsoft.com/office/infopath/2007/PartnerControls"/>
-    <ds:schemaRef ds:uri="http://purl.org/dc/dcmitype/"/>
-  </ds:schemaRefs>
-</ds:datastoreItem>
 </file>
</xml_diff>